<commit_message>
Finalizacao dos testes de integracao, configuracao de healthcheck e swagger
</commit_message>
<xml_diff>
--- a/ppt/apresentacao_testes.pptx
+++ b/ppt/apresentacao_testes.pptx
@@ -4149,7 +4149,7 @@
           </a:ln>
           <a:extLst>
             <a:ext uri="{C572A759-6A51-4108-AA02-DFA0A04FC94B}">
-              <ma14:wrappingTextBoxFlag xmlns:ma14="http://schemas.microsoft.com/office/mac/drawingml/2011/main" xmlns="" val="1"/>
+              <ma14:wrappingTextBoxFlag xmlns="" xmlns:ma14="http://schemas.microsoft.com/office/mac/drawingml/2011/main" val="1"/>
             </a:ext>
           </a:extLst>
         </p:spPr>
@@ -4283,7 +4283,7 @@
           </a:ln>
           <a:extLst>
             <a:ext uri="{C572A759-6A51-4108-AA02-DFA0A04FC94B}">
-              <ma14:wrappingTextBoxFlag xmlns:ma14="http://schemas.microsoft.com/office/mac/drawingml/2011/main" xmlns="" val="1"/>
+              <ma14:wrappingTextBoxFlag xmlns="" xmlns:ma14="http://schemas.microsoft.com/office/mac/drawingml/2011/main" val="1"/>
             </a:ext>
           </a:extLst>
         </p:spPr>
@@ -4485,7 +4485,7 @@
           </a:ln>
           <a:extLst>
             <a:ext uri="{C572A759-6A51-4108-AA02-DFA0A04FC94B}">
-              <ma14:wrappingTextBoxFlag xmlns:ma14="http://schemas.microsoft.com/office/mac/drawingml/2011/main" xmlns="" val="1"/>
+              <ma14:wrappingTextBoxFlag xmlns="" xmlns:ma14="http://schemas.microsoft.com/office/mac/drawingml/2011/main" val="1"/>
             </a:ext>
           </a:extLst>
         </p:spPr>
@@ -4619,7 +4619,7 @@
           </a:ln>
           <a:extLst>
             <a:ext uri="{C572A759-6A51-4108-AA02-DFA0A04FC94B}">
-              <ma14:wrappingTextBoxFlag xmlns:ma14="http://schemas.microsoft.com/office/mac/drawingml/2011/main" xmlns="" val="1"/>
+              <ma14:wrappingTextBoxFlag xmlns="" xmlns:ma14="http://schemas.microsoft.com/office/mac/drawingml/2011/main" val="1"/>
             </a:ext>
           </a:extLst>
         </p:spPr>
@@ -4885,7 +4885,7 @@
           </a:ln>
           <a:extLst>
             <a:ext uri="{C572A759-6A51-4108-AA02-DFA0A04FC94B}">
-              <ma14:wrappingTextBoxFlag xmlns:ma14="http://schemas.microsoft.com/office/mac/drawingml/2011/main" xmlns="" val="1"/>
+              <ma14:wrappingTextBoxFlag xmlns="" xmlns:ma14="http://schemas.microsoft.com/office/mac/drawingml/2011/main" val="1"/>
             </a:ext>
           </a:extLst>
         </p:spPr>
@@ -5220,7 +5220,7 @@
           </a:ln>
           <a:extLst>
             <a:ext uri="{C572A759-6A51-4108-AA02-DFA0A04FC94B}">
-              <ma14:wrappingTextBoxFlag xmlns:ma14="http://schemas.microsoft.com/office/mac/drawingml/2011/main" xmlns="" val="1"/>
+              <ma14:wrappingTextBoxFlag xmlns="" xmlns:ma14="http://schemas.microsoft.com/office/mac/drawingml/2011/main" val="1"/>
             </a:ext>
           </a:extLst>
         </p:spPr>
@@ -5338,8 +5338,8 @@
         </p:nvSpPr>
         <p:spPr>
           <a:xfrm>
-            <a:off x="775322" y="1294131"/>
-            <a:ext cx="10150983" cy="3416320"/>
+            <a:off x="759823" y="1912023"/>
+            <a:ext cx="10150983" cy="2308324"/>
           </a:xfrm>
           <a:prstGeom prst="rect">
             <a:avLst/>
@@ -5358,33 +5358,7 @@
                 <a:latin typeface="Microsoft JhengHei" panose="020B0604030504040204" pitchFamily="34" charset="-120"/>
                 <a:ea typeface="Microsoft JhengHei" panose="020B0604030504040204" pitchFamily="34" charset="-120"/>
               </a:rPr>
-              <a:t>Implementando</a:t>
-            </a:r>
-            <a:br>
-              <a:rPr lang="pt-BR" sz="7200" dirty="0">
-                <a:latin typeface="Microsoft JhengHei" panose="020B0604030504040204" pitchFamily="34" charset="-120"/>
-                <a:ea typeface="Microsoft JhengHei" panose="020B0604030504040204" pitchFamily="34" charset="-120"/>
-              </a:rPr>
-            </a:br>
-            <a:r>
-              <a:rPr lang="pt-BR" sz="7200" dirty="0">
-                <a:latin typeface="Microsoft JhengHei" panose="020B0604030504040204" pitchFamily="34" charset="-120"/>
-                <a:ea typeface="Microsoft JhengHei" panose="020B0604030504040204" pitchFamily="34" charset="-120"/>
-              </a:rPr>
-              <a:t>Testes </a:t>
-            </a:r>
-            <a:br>
-              <a:rPr lang="pt-BR" sz="7200" dirty="0">
-                <a:latin typeface="Microsoft JhengHei" panose="020B0604030504040204" pitchFamily="34" charset="-120"/>
-                <a:ea typeface="Microsoft JhengHei" panose="020B0604030504040204" pitchFamily="34" charset="-120"/>
-              </a:rPr>
-            </a:br>
-            <a:r>
-              <a:rPr lang="pt-BR" sz="7200" dirty="0">
-                <a:latin typeface="Microsoft JhengHei" panose="020B0604030504040204" pitchFamily="34" charset="-120"/>
-                <a:ea typeface="Microsoft JhengHei" panose="020B0604030504040204" pitchFamily="34" charset="-120"/>
-              </a:rPr>
-              <a:t>com C#</a:t>
+              <a:t>Desenvolvimento com Testes</a:t>
             </a:r>
           </a:p>
         </p:txBody>
@@ -5513,7 +5487,7 @@
           </a:ln>
           <a:extLst>
             <a:ext uri="{C572A759-6A51-4108-AA02-DFA0A04FC94B}">
-              <ma14:wrappingTextBoxFlag xmlns:ma14="http://schemas.microsoft.com/office/mac/drawingml/2011/main" xmlns="" val="1"/>
+              <ma14:wrappingTextBoxFlag xmlns="" xmlns:ma14="http://schemas.microsoft.com/office/mac/drawingml/2011/main" val="1"/>
             </a:ext>
           </a:extLst>
         </p:spPr>
@@ -5890,7 +5864,7 @@
           </a:ln>
           <a:extLst>
             <a:ext uri="{C572A759-6A51-4108-AA02-DFA0A04FC94B}">
-              <ma14:wrappingTextBoxFlag xmlns:ma14="http://schemas.microsoft.com/office/mac/drawingml/2011/main" xmlns="" val="1"/>
+              <ma14:wrappingTextBoxFlag xmlns="" xmlns:ma14="http://schemas.microsoft.com/office/mac/drawingml/2011/main" val="1"/>
             </a:ext>
           </a:extLst>
         </p:spPr>
@@ -6024,7 +5998,7 @@
           </a:ln>
           <a:extLst>
             <a:ext uri="{C572A759-6A51-4108-AA02-DFA0A04FC94B}">
-              <ma14:wrappingTextBoxFlag xmlns:ma14="http://schemas.microsoft.com/office/mac/drawingml/2011/main" xmlns="" val="1"/>
+              <ma14:wrappingTextBoxFlag xmlns="" xmlns:ma14="http://schemas.microsoft.com/office/mac/drawingml/2011/main" val="1"/>
             </a:ext>
           </a:extLst>
         </p:spPr>
@@ -6275,7 +6249,7 @@
           </a:ln>
           <a:extLst>
             <a:ext uri="{C572A759-6A51-4108-AA02-DFA0A04FC94B}">
-              <ma14:wrappingTextBoxFlag xmlns:ma14="http://schemas.microsoft.com/office/mac/drawingml/2011/main" xmlns="" val="1"/>
+              <ma14:wrappingTextBoxFlag xmlns="" xmlns:ma14="http://schemas.microsoft.com/office/mac/drawingml/2011/main" val="1"/>
             </a:ext>
           </a:extLst>
         </p:spPr>
@@ -6409,7 +6383,7 @@
           </a:ln>
           <a:extLst>
             <a:ext uri="{C572A759-6A51-4108-AA02-DFA0A04FC94B}">
-              <ma14:wrappingTextBoxFlag xmlns:ma14="http://schemas.microsoft.com/office/mac/drawingml/2011/main" xmlns="" val="1"/>
+              <ma14:wrappingTextBoxFlag xmlns="" xmlns:ma14="http://schemas.microsoft.com/office/mac/drawingml/2011/main" val="1"/>
             </a:ext>
           </a:extLst>
         </p:spPr>
@@ -6532,7 +6506,7 @@
           </a:ln>
           <a:extLst>
             <a:ext uri="{C572A759-6A51-4108-AA02-DFA0A04FC94B}">
-              <ma14:wrappingTextBoxFlag xmlns:ma14="http://schemas.microsoft.com/office/mac/drawingml/2011/main" xmlns="" val="1"/>
+              <ma14:wrappingTextBoxFlag xmlns="" xmlns:ma14="http://schemas.microsoft.com/office/mac/drawingml/2011/main" val="1"/>
             </a:ext>
           </a:extLst>
         </p:spPr>
@@ -6666,7 +6640,7 @@
           </a:ln>
           <a:extLst>
             <a:ext uri="{C572A759-6A51-4108-AA02-DFA0A04FC94B}">
-              <ma14:wrappingTextBoxFlag xmlns:ma14="http://schemas.microsoft.com/office/mac/drawingml/2011/main" xmlns="" val="1"/>
+              <ma14:wrappingTextBoxFlag xmlns="" xmlns:ma14="http://schemas.microsoft.com/office/mac/drawingml/2011/main" val="1"/>
             </a:ext>
           </a:extLst>
         </p:spPr>
@@ -6791,7 +6765,7 @@
           </a:ln>
           <a:extLst>
             <a:ext uri="{C572A759-6A51-4108-AA02-DFA0A04FC94B}">
-              <ma14:wrappingTextBoxFlag xmlns:ma14="http://schemas.microsoft.com/office/mac/drawingml/2011/main" xmlns="" val="1"/>
+              <ma14:wrappingTextBoxFlag xmlns="" xmlns:ma14="http://schemas.microsoft.com/office/mac/drawingml/2011/main" val="1"/>
             </a:ext>
           </a:extLst>
         </p:spPr>
@@ -6925,7 +6899,7 @@
           </a:ln>
           <a:extLst>
             <a:ext uri="{C572A759-6A51-4108-AA02-DFA0A04FC94B}">
-              <ma14:wrappingTextBoxFlag xmlns:ma14="http://schemas.microsoft.com/office/mac/drawingml/2011/main" xmlns="" val="1"/>
+              <ma14:wrappingTextBoxFlag xmlns="" xmlns:ma14="http://schemas.microsoft.com/office/mac/drawingml/2011/main" val="1"/>
             </a:ext>
           </a:extLst>
         </p:spPr>
@@ -6991,6 +6965,103 @@
                 <a:ea typeface="Microsoft JhengHei" panose="020B0604030504040204" pitchFamily="34" charset="-120"/>
               </a:rPr>
               <a:t>Testes de Integração</a:t>
+            </a:r>
+          </a:p>
+        </p:txBody>
+      </p:sp>
+      <p:sp>
+        <p:nvSpPr>
+          <p:cNvPr id="2" name="TextBox 1">
+            <a:extLst>
+              <a:ext uri="{FF2B5EF4-FFF2-40B4-BE49-F238E27FC236}">
+                <a16:creationId xmlns:a16="http://schemas.microsoft.com/office/drawing/2014/main" id="{15EF50B9-0E90-49F3-AD52-B59BD24FE89A}"/>
+              </a:ext>
+            </a:extLst>
+          </p:cNvPr>
+          <p:cNvSpPr txBox="1"/>
+          <p:nvPr/>
+        </p:nvSpPr>
+        <p:spPr>
+          <a:xfrm>
+            <a:off x="162369" y="1751308"/>
+            <a:ext cx="10934417" cy="1938992"/>
+          </a:xfrm>
+          <a:prstGeom prst="rect">
+            <a:avLst/>
+          </a:prstGeom>
+          <a:noFill/>
+        </p:spPr>
+        <p:txBody>
+          <a:bodyPr wrap="square" rtlCol="0">
+            <a:spAutoFit/>
+          </a:bodyPr>
+          <a:lstStyle/>
+          <a:p>
+            <a:r>
+              <a:rPr lang="pt-BR" sz="2400" dirty="0">
+                <a:latin typeface="Microsoft JhengHei" panose="020B0604030504040204" pitchFamily="34" charset="-120"/>
+                <a:ea typeface="Microsoft JhengHei" panose="020B0604030504040204" pitchFamily="34" charset="-120"/>
+              </a:rPr>
+              <a:t>Testes que integram </a:t>
+            </a:r>
+            <a:r>
+              <a:rPr lang="pt-BR" sz="2400" b="1" dirty="0">
+                <a:latin typeface="Microsoft JhengHei" panose="020B0604030504040204" pitchFamily="34" charset="-120"/>
+                <a:ea typeface="Microsoft JhengHei" panose="020B0604030504040204" pitchFamily="34" charset="-120"/>
+              </a:rPr>
+              <a:t>PARTES</a:t>
+            </a:r>
+            <a:r>
+              <a:rPr lang="pt-BR" sz="2400" dirty="0">
+                <a:latin typeface="Microsoft JhengHei" panose="020B0604030504040204" pitchFamily="34" charset="-120"/>
+                <a:ea typeface="Microsoft JhengHei" panose="020B0604030504040204" pitchFamily="34" charset="-120"/>
+              </a:rPr>
+              <a:t> do seu sistema:</a:t>
+            </a:r>
+          </a:p>
+          <a:p>
+            <a:endParaRPr lang="pt-BR" sz="2400" dirty="0">
+              <a:latin typeface="Microsoft JhengHei" panose="020B0604030504040204" pitchFamily="34" charset="-120"/>
+              <a:ea typeface="Microsoft JhengHei" panose="020B0604030504040204" pitchFamily="34" charset="-120"/>
+            </a:endParaRPr>
+          </a:p>
+          <a:p>
+            <a:pPr marL="342900" indent="-342900">
+              <a:buFont typeface="Arial" panose="020B0604020202020204" pitchFamily="34" charset="0"/>
+              <a:buChar char="•"/>
+            </a:pPr>
+            <a:r>
+              <a:rPr lang="pt-BR" sz="2400" dirty="0">
+                <a:latin typeface="Microsoft JhengHei" panose="020B0604030504040204" pitchFamily="34" charset="-120"/>
+                <a:ea typeface="Microsoft JhengHei" panose="020B0604030504040204" pitchFamily="34" charset="-120"/>
+              </a:rPr>
+              <a:t>Banco de dados;</a:t>
+            </a:r>
+          </a:p>
+          <a:p>
+            <a:pPr marL="342900" indent="-342900">
+              <a:buFont typeface="Arial" panose="020B0604020202020204" pitchFamily="34" charset="0"/>
+              <a:buChar char="•"/>
+            </a:pPr>
+            <a:r>
+              <a:rPr lang="pt-BR" sz="2400" dirty="0">
+                <a:latin typeface="Microsoft JhengHei" panose="020B0604030504040204" pitchFamily="34" charset="-120"/>
+                <a:ea typeface="Microsoft JhengHei" panose="020B0604030504040204" pitchFamily="34" charset="-120"/>
+              </a:rPr>
+              <a:t>Chamadas HTTP;</a:t>
+            </a:r>
+          </a:p>
+          <a:p>
+            <a:pPr marL="342900" indent="-342900">
+              <a:buFont typeface="Arial" panose="020B0604020202020204" pitchFamily="34" charset="0"/>
+              <a:buChar char="•"/>
+            </a:pPr>
+            <a:r>
+              <a:rPr lang="pt-BR" sz="2400" dirty="0">
+                <a:latin typeface="Microsoft JhengHei" panose="020B0604030504040204" pitchFamily="34" charset="-120"/>
+                <a:ea typeface="Microsoft JhengHei" panose="020B0604030504040204" pitchFamily="34" charset="-120"/>
+              </a:rPr>
+              <a:t>Serviços externos.</a:t>
             </a:r>
           </a:p>
         </p:txBody>
@@ -7050,7 +7121,7 @@
           </a:ln>
           <a:extLst>
             <a:ext uri="{C572A759-6A51-4108-AA02-DFA0A04FC94B}">
-              <ma14:wrappingTextBoxFlag xmlns:ma14="http://schemas.microsoft.com/office/mac/drawingml/2011/main" xmlns="" val="1"/>
+              <ma14:wrappingTextBoxFlag xmlns="" xmlns:ma14="http://schemas.microsoft.com/office/mac/drawingml/2011/main" val="1"/>
             </a:ext>
           </a:extLst>
         </p:spPr>
@@ -7184,7 +7255,7 @@
           </a:ln>
           <a:extLst>
             <a:ext uri="{C572A759-6A51-4108-AA02-DFA0A04FC94B}">
-              <ma14:wrappingTextBoxFlag xmlns:ma14="http://schemas.microsoft.com/office/mac/drawingml/2011/main" xmlns="" val="1"/>
+              <ma14:wrappingTextBoxFlag xmlns="" xmlns:ma14="http://schemas.microsoft.com/office/mac/drawingml/2011/main" val="1"/>
             </a:ext>
           </a:extLst>
         </p:spPr>
@@ -7309,7 +7380,7 @@
           </a:ln>
           <a:extLst>
             <a:ext uri="{C572A759-6A51-4108-AA02-DFA0A04FC94B}">
-              <ma14:wrappingTextBoxFlag xmlns:ma14="http://schemas.microsoft.com/office/mac/drawingml/2011/main" xmlns="" val="1"/>
+              <ma14:wrappingTextBoxFlag xmlns="" xmlns:ma14="http://schemas.microsoft.com/office/mac/drawingml/2011/main" val="1"/>
             </a:ext>
           </a:extLst>
         </p:spPr>
@@ -7443,7 +7514,7 @@
           </a:ln>
           <a:extLst>
             <a:ext uri="{C572A759-6A51-4108-AA02-DFA0A04FC94B}">
-              <ma14:wrappingTextBoxFlag xmlns:ma14="http://schemas.microsoft.com/office/mac/drawingml/2011/main" xmlns="" val="1"/>
+              <ma14:wrappingTextBoxFlag xmlns="" xmlns:ma14="http://schemas.microsoft.com/office/mac/drawingml/2011/main" val="1"/>
             </a:ext>
           </a:extLst>
         </p:spPr>

</xml_diff>